<commit_message>
Branch and Pull Request/Merge
</commit_message>
<xml_diff>
--- a/ch01_GitGitHub.pptx
+++ b/ch01_GitGitHub.pptx
@@ -211,7 +211,7 @@
             <a:fld id="{6837EDA8-41C8-4B24-A206-13C08A65A6D7}" type="datetimeFigureOut">
               <a:rPr lang="zh-TW" altLang="en-US" smtClean="0"/>
               <a:pPr/>
-              <a:t>2019/5/9</a:t>
+              <a:t>2019/5/10</a:t>
             </a:fld>
             <a:endParaRPr lang="zh-TW" altLang="en-US"/>
           </a:p>
@@ -664,7 +664,7 @@
             <a:fld id="{8B85509C-BD4F-47BF-9B1E-FC2E949B3621}" type="datetime1">
               <a:rPr lang="zh-TW" altLang="en-US" smtClean="0"/>
               <a:pPr/>
-              <a:t>2019/5/9</a:t>
+              <a:t>2019/5/10</a:t>
             </a:fld>
             <a:endParaRPr lang="zh-TW" altLang="en-US"/>
           </a:p>
@@ -837,7 +837,7 @@
             <a:fld id="{42251B24-F787-4C15-8A0F-7AEC20C70069}" type="datetime1">
               <a:rPr lang="zh-TW" altLang="en-US" smtClean="0"/>
               <a:pPr/>
-              <a:t>2019/5/9</a:t>
+              <a:t>2019/5/10</a:t>
             </a:fld>
             <a:endParaRPr lang="zh-TW" altLang="en-US"/>
           </a:p>
@@ -1012,7 +1012,7 @@
             <a:fld id="{9CA0D33C-CE2B-45F1-B8D4-FFD1F131F331}" type="datetime1">
               <a:rPr lang="zh-TW" altLang="en-US" smtClean="0"/>
               <a:pPr/>
-              <a:t>2019/5/9</a:t>
+              <a:t>2019/5/10</a:t>
             </a:fld>
             <a:endParaRPr lang="zh-TW" altLang="en-US"/>
           </a:p>
@@ -1177,7 +1177,7 @@
             <a:fld id="{50B99440-D9EF-40CC-9B52-F6428D9B2C76}" type="datetime1">
               <a:rPr lang="zh-TW" altLang="en-US" smtClean="0"/>
               <a:pPr/>
-              <a:t>2019/5/9</a:t>
+              <a:t>2019/5/10</a:t>
             </a:fld>
             <a:endParaRPr lang="zh-TW" altLang="en-US"/>
           </a:p>
@@ -1419,7 +1419,7 @@
             <a:fld id="{0871BF52-5C6C-4959-8E27-CECB68D39FE4}" type="datetime1">
               <a:rPr lang="zh-TW" altLang="en-US" smtClean="0"/>
               <a:pPr/>
-              <a:t>2019/5/9</a:t>
+              <a:t>2019/5/10</a:t>
             </a:fld>
             <a:endParaRPr lang="zh-TW" altLang="en-US"/>
           </a:p>
@@ -1701,7 +1701,7 @@
             <a:fld id="{DF863F05-2DD9-4EB1-A827-12FD992DE9DC}" type="datetime1">
               <a:rPr lang="zh-TW" altLang="en-US" smtClean="0"/>
               <a:pPr/>
-              <a:t>2019/5/9</a:t>
+              <a:t>2019/5/10</a:t>
             </a:fld>
             <a:endParaRPr lang="zh-TW" altLang="en-US"/>
           </a:p>
@@ -2117,7 +2117,7 @@
             <a:fld id="{6339AF51-4491-4873-A096-75DB6CE47516}" type="datetime1">
               <a:rPr lang="zh-TW" altLang="en-US" smtClean="0"/>
               <a:pPr/>
-              <a:t>2019/5/9</a:t>
+              <a:t>2019/5/10</a:t>
             </a:fld>
             <a:endParaRPr lang="zh-TW" altLang="en-US"/>
           </a:p>
@@ -2231,7 +2231,7 @@
             <a:fld id="{EE4AD9C8-8B9E-40FF-ABE2-858AC2057BBB}" type="datetime1">
               <a:rPr lang="zh-TW" altLang="en-US" smtClean="0"/>
               <a:pPr/>
-              <a:t>2019/5/9</a:t>
+              <a:t>2019/5/10</a:t>
             </a:fld>
             <a:endParaRPr lang="zh-TW" altLang="en-US"/>
           </a:p>
@@ -2323,7 +2323,7 @@
             <a:fld id="{B4784999-BBBE-4BE4-A8D0-877E7D1D66CC}" type="datetime1">
               <a:rPr lang="zh-TW" altLang="en-US" smtClean="0"/>
               <a:pPr/>
-              <a:t>2019/5/9</a:t>
+              <a:t>2019/5/10</a:t>
             </a:fld>
             <a:endParaRPr lang="zh-TW" altLang="en-US"/>
           </a:p>
@@ -2595,7 +2595,7 @@
             <a:fld id="{E88D17E6-02BD-4944-B9FE-7BFCCBF83D48}" type="datetime1">
               <a:rPr lang="zh-TW" altLang="en-US" smtClean="0"/>
               <a:pPr/>
-              <a:t>2019/5/9</a:t>
+              <a:t>2019/5/10</a:t>
             </a:fld>
             <a:endParaRPr lang="zh-TW" altLang="en-US"/>
           </a:p>
@@ -2844,7 +2844,7 @@
             <a:fld id="{3C13E23D-1FEF-4D78-A3A3-3D6F2BB31954}" type="datetime1">
               <a:rPr lang="zh-TW" altLang="en-US" smtClean="0"/>
               <a:pPr/>
-              <a:t>2019/5/9</a:t>
+              <a:t>2019/5/10</a:t>
             </a:fld>
             <a:endParaRPr lang="zh-TW" altLang="en-US"/>
           </a:p>
@@ -3052,7 +3052,7 @@
             <a:fld id="{06197F35-AD6F-4594-8B50-334492D2E7E8}" type="datetime1">
               <a:rPr lang="zh-TW" altLang="en-US" smtClean="0"/>
               <a:pPr/>
-              <a:t>2019/5/9</a:t>
+              <a:t>2019/5/10</a:t>
             </a:fld>
             <a:endParaRPr lang="zh-TW" altLang="en-US"/>
           </a:p>
@@ -3513,7 +3513,7 @@
             <a:fld id="{C389EDC9-19E3-47AC-9C57-C6A24DEA81AD}" type="datetime1">
               <a:rPr lang="zh-TW" altLang="en-US" smtClean="0"/>
               <a:pPr/>
-              <a:t>2019/5/9</a:t>
+              <a:t>2019/5/10</a:t>
             </a:fld>
             <a:endParaRPr lang="zh-TW" altLang="en-US"/>
           </a:p>
@@ -3545,10 +3545,10 @@
       </p:sp>
       <p:pic>
         <p:nvPicPr>
-          <p:cNvPr id="4" name="Picture 3">
+          <p:cNvPr id="7" name="Picture 6">
             <a:extLst>
               <a:ext uri="{FF2B5EF4-FFF2-40B4-BE49-F238E27FC236}">
-                <a16:creationId xmlns:a16="http://schemas.microsoft.com/office/drawing/2014/main" id="{9B4763A8-1DCA-4A59-9A2E-776B4CB0DB69}"/>
+                <a16:creationId xmlns:a16="http://schemas.microsoft.com/office/drawing/2014/main" id="{C5D933CB-04A5-438A-8D8E-F07430CA2860}"/>
               </a:ext>
             </a:extLst>
           </p:cNvPr>
@@ -3565,8 +3565,8 @@
         </p:blipFill>
         <p:spPr>
           <a:xfrm>
-            <a:off x="4029026" y="3698469"/>
-            <a:ext cx="862012" cy="833437"/>
+            <a:off x="4042507" y="3668596"/>
+            <a:ext cx="1058986" cy="957275"/>
           </a:xfrm>
           <a:prstGeom prst="rect">
             <a:avLst/>
@@ -3967,7 +3967,7 @@
             <a:fld id="{A4F910E6-8D00-4BAF-8C48-9688E0B449D3}" type="datetime1">
               <a:rPr lang="zh-TW" altLang="en-US" smtClean="0"/>
               <a:pPr/>
-              <a:t>2019/5/9</a:t>
+              <a:t>2019/5/10</a:t>
             </a:fld>
             <a:endParaRPr lang="zh-TW" altLang="en-US"/>
           </a:p>
@@ -4109,7 +4109,7 @@
             <a:fld id="{4E46BE27-E923-4EC2-B046-3272AE2A3E5C}" type="datetime1">
               <a:rPr lang="zh-TW" altLang="en-US" smtClean="0"/>
               <a:pPr/>
-              <a:t>2019/5/9</a:t>
+              <a:t>2019/5/10</a:t>
             </a:fld>
             <a:endParaRPr lang="zh-TW" altLang="en-US"/>
           </a:p>

</xml_diff>